<commit_message>
Apresentacao sobre expressoes regulares.
</commit_message>
<xml_diff>
--- a/Redmine.pptx
+++ b/Redmine.pptx
@@ -23,8 +23,9 @@
     <p:sldId id="271" r:id="rId17"/>
     <p:sldId id="272" r:id="rId18"/>
     <p:sldId id="273" r:id="rId19"/>
-    <p:sldId id="274" r:id="rId20"/>
-    <p:sldId id="275" r:id="rId21"/>
+    <p:sldId id="276" r:id="rId20"/>
+    <p:sldId id="274" r:id="rId21"/>
+    <p:sldId id="275" r:id="rId22"/>
   </p:sldIdLst>
   <p:sldSz cx="9144000" cy="6858000" type="screen4x3"/>
   <p:notesSz cx="6858000" cy="9144000"/>
@@ -160,7 +161,7 @@
           <a:p>
             <a:fld id="{4251665B-C24A-4702-B522-6A4334602E03}" type="datetimeFigureOut">
               <a:rPr lang="en-US" smtClean="0"/>
-              <a:t>18/12/16</a:t>
+              <a:t>19/12/16</a:t>
             </a:fld>
             <a:endParaRPr lang="en-US"/>
           </a:p>
@@ -917,7 +918,7 @@
           <a:p>
             <a:fld id="{4251665B-C24A-4702-B522-6A4334602E03}" type="datetimeFigureOut">
               <a:rPr lang="en-US" smtClean="0"/>
-              <a:t>18/12/16</a:t>
+              <a:t>19/12/16</a:t>
             </a:fld>
             <a:endParaRPr lang="en-US"/>
           </a:p>
@@ -1541,7 +1542,7 @@
           <a:p>
             <a:fld id="{4251665B-C24A-4702-B522-6A4334602E03}" type="datetimeFigureOut">
               <a:rPr lang="en-US" smtClean="0"/>
-              <a:t>18/12/16</a:t>
+              <a:t>19/12/16</a:t>
             </a:fld>
             <a:endParaRPr lang="en-US"/>
           </a:p>
@@ -1964,7 +1965,7 @@
           <a:p>
             <a:fld id="{4251665B-C24A-4702-B522-6A4334602E03}" type="datetimeFigureOut">
               <a:rPr lang="en-US" smtClean="0"/>
-              <a:t>18/12/16</a:t>
+              <a:t>19/12/16</a:t>
             </a:fld>
             <a:endParaRPr lang="en-US"/>
           </a:p>
@@ -2141,7 +2142,7 @@
           <a:p>
             <a:fld id="{4251665B-C24A-4702-B522-6A4334602E03}" type="datetimeFigureOut">
               <a:rPr lang="en-US" smtClean="0"/>
-              <a:t>18/12/16</a:t>
+              <a:t>19/12/16</a:t>
             </a:fld>
             <a:endParaRPr lang="en-US"/>
           </a:p>
@@ -2958,7 +2959,7 @@
           <a:p>
             <a:fld id="{4251665B-C24A-4702-B522-6A4334602E03}" type="datetimeFigureOut">
               <a:rPr lang="en-US" smtClean="0"/>
-              <a:t>18/12/16</a:t>
+              <a:t>19/12/16</a:t>
             </a:fld>
             <a:endParaRPr lang="en-US"/>
           </a:p>
@@ -3469,7 +3470,7 @@
           <a:p>
             <a:fld id="{4251665B-C24A-4702-B522-6A4334602E03}" type="datetimeFigureOut">
               <a:rPr lang="en-US" smtClean="0"/>
-              <a:t>18/12/16</a:t>
+              <a:t>19/12/16</a:t>
             </a:fld>
             <a:endParaRPr lang="en-US"/>
           </a:p>
@@ -3702,7 +3703,7 @@
           <a:p>
             <a:fld id="{4251665B-C24A-4702-B522-6A4334602E03}" type="datetimeFigureOut">
               <a:rPr lang="en-US" smtClean="0"/>
-              <a:t>18/12/16</a:t>
+              <a:t>19/12/16</a:t>
             </a:fld>
             <a:endParaRPr lang="en-US"/>
           </a:p>
@@ -4227,7 +4228,7 @@
           <a:p>
             <a:fld id="{4251665B-C24A-4702-B522-6A4334602E03}" type="datetimeFigureOut">
               <a:rPr lang="en-US" smtClean="0"/>
-              <a:t>18/12/16</a:t>
+              <a:t>19/12/16</a:t>
             </a:fld>
             <a:endParaRPr lang="en-US"/>
           </a:p>
@@ -4362,7 +4363,7 @@
           <a:p>
             <a:fld id="{4251665B-C24A-4702-B522-6A4334602E03}" type="datetimeFigureOut">
               <a:rPr lang="en-US" smtClean="0"/>
-              <a:t>18/12/16</a:t>
+              <a:t>19/12/16</a:t>
             </a:fld>
             <a:endParaRPr lang="en-US"/>
           </a:p>
@@ -5260,7 +5261,7 @@
           <a:p>
             <a:fld id="{4251665B-C24A-4702-B522-6A4334602E03}" type="datetimeFigureOut">
               <a:rPr lang="en-US" smtClean="0"/>
-              <a:t>18/12/16</a:t>
+              <a:t>19/12/16</a:t>
             </a:fld>
             <a:endParaRPr lang="en-US"/>
           </a:p>
@@ -5383,7 +5384,7 @@
           <a:p>
             <a:fld id="{4251665B-C24A-4702-B522-6A4334602E03}" type="datetimeFigureOut">
               <a:rPr lang="en-US" smtClean="0"/>
-              <a:t>18/12/16</a:t>
+              <a:t>19/12/16</a:t>
             </a:fld>
             <a:endParaRPr lang="en-US"/>
           </a:p>
@@ -6267,7 +6268,7 @@
           <a:p>
             <a:fld id="{4251665B-C24A-4702-B522-6A4334602E03}" type="datetimeFigureOut">
               <a:rPr lang="en-US" smtClean="0"/>
-              <a:t>18/12/16</a:t>
+              <a:t>19/12/16</a:t>
             </a:fld>
             <a:endParaRPr lang="en-US"/>
           </a:p>
@@ -6915,7 +6916,7 @@
           <a:p>
             <a:fld id="{4251665B-C24A-4702-B522-6A4334602E03}" type="datetimeFigureOut">
               <a:rPr lang="en-US" smtClean="0"/>
-              <a:t>18/12/16</a:t>
+              <a:t>19/12/16</a:t>
             </a:fld>
             <a:endParaRPr lang="en-US"/>
           </a:p>
@@ -7231,7 +7232,7 @@
           <a:p>
             <a:fld id="{4251665B-C24A-4702-B522-6A4334602E03}" type="datetimeFigureOut">
               <a:rPr lang="en-US" smtClean="0"/>
-              <a:t>18/12/16</a:t>
+              <a:t>19/12/16</a:t>
             </a:fld>
             <a:endParaRPr lang="en-US"/>
           </a:p>
@@ -7321,7 +7322,7 @@
           <a:p>
             <a:fld id="{4251665B-C24A-4702-B522-6A4334602E03}" type="datetimeFigureOut">
               <a:rPr lang="en-US" smtClean="0"/>
-              <a:t>18/12/16</a:t>
+              <a:t>19/12/16</a:t>
             </a:fld>
             <a:endParaRPr lang="en-US"/>
           </a:p>
@@ -7649,7 +7650,7 @@
           <a:p>
             <a:fld id="{4251665B-C24A-4702-B522-6A4334602E03}" type="datetimeFigureOut">
               <a:rPr lang="en-US" smtClean="0"/>
-              <a:t>18/12/16</a:t>
+              <a:t>19/12/16</a:t>
             </a:fld>
             <a:endParaRPr lang="en-US"/>
           </a:p>
@@ -8224,8 +8225,8 @@
         </p:nvSpPr>
         <p:spPr>
           <a:xfrm>
-            <a:off x="421341" y="3293794"/>
-            <a:ext cx="8412161" cy="1200329"/>
+            <a:off x="421341" y="3307751"/>
+            <a:ext cx="8412161" cy="2862323"/>
           </a:xfrm>
           <a:prstGeom prst="rect">
             <a:avLst/>
@@ -8244,6 +8245,11 @@
             </a:r>
           </a:p>
           <a:p>
+            <a:endParaRPr lang="en-US" dirty="0" smtClean="0">
+              <a:hlinkClick r:id="rId2"/>
+            </a:endParaRPr>
+          </a:p>
+          <a:p>
             <a:r>
               <a:rPr lang="en-US" dirty="0" smtClean="0">
                 <a:hlinkClick r:id="rId2"/>
@@ -8253,9 +8259,44 @@
             <a:endParaRPr lang="en-US" dirty="0" smtClean="0"/>
           </a:p>
           <a:p>
+            <a:r>
+              <a:rPr lang="en-US" dirty="0"/>
+              <a:t>https://</a:t>
+            </a:r>
+            <a:r>
+              <a:rPr lang="en-US" dirty="0" err="1"/>
+              <a:t>github.com</a:t>
+            </a:r>
+            <a:r>
+              <a:rPr lang="en-US" dirty="0"/>
+              <a:t>/</a:t>
+            </a:r>
+            <a:r>
+              <a:rPr lang="en-US" dirty="0" err="1"/>
+              <a:t>ronan-vargas</a:t>
+            </a:r>
+            <a:r>
+              <a:rPr lang="en-US" dirty="0" smtClean="0"/>
+              <a:t>/</a:t>
+            </a:r>
+          </a:p>
+          <a:p>
             <a:endParaRPr lang="en-US" dirty="0"/>
           </a:p>
           <a:p>
+            <a:endParaRPr lang="en-US" dirty="0" smtClean="0"/>
+          </a:p>
+          <a:p>
+            <a:endParaRPr lang="en-US" dirty="0"/>
+          </a:p>
+          <a:p>
+            <a:endParaRPr lang="en-US" dirty="0" smtClean="0"/>
+          </a:p>
+          <a:p>
+            <a:endParaRPr lang="en-US" dirty="0"/>
+          </a:p>
+          <a:p>
+            <a:pPr algn="ctr"/>
             <a:r>
               <a:rPr lang="en-US" dirty="0" smtClean="0"/>
               <a:t>Porto </a:t>
@@ -9628,13 +9669,13 @@
         </p:nvSpPr>
         <p:spPr>
           <a:xfrm>
-            <a:off x="284164" y="1828336"/>
-            <a:ext cx="4348890" cy="4297828"/>
+            <a:off x="284163" y="1828336"/>
+            <a:ext cx="8574087" cy="4297828"/>
           </a:xfrm>
         </p:spPr>
         <p:txBody>
           <a:bodyPr>
-            <a:normAutofit fontScale="47500" lnSpcReduction="20000"/>
+            <a:normAutofit/>
           </a:bodyPr>
           <a:lstStyle/>
           <a:p>
@@ -9644,52 +9685,150 @@
             <a:endParaRPr lang="en-US" dirty="0" smtClean="0"/>
           </a:p>
           <a:p>
-            <a:r>
-              <a:rPr lang="en-US" sz="5600" dirty="0" smtClean="0"/>
-              <a:t>Users </a:t>
-            </a:r>
-            <a:r>
-              <a:rPr lang="en-US" sz="5600" dirty="0"/>
-              <a:t>-&gt; Users</a:t>
-            </a:r>
-          </a:p>
-          <a:p>
-            <a:r>
-              <a:rPr lang="en-US" sz="5600" dirty="0"/>
-              <a:t>Teams -&gt; Groups</a:t>
-            </a:r>
-          </a:p>
-          <a:p>
-            <a:r>
-              <a:rPr lang="en-US" sz="5600" dirty="0"/>
-              <a:t>Team Authorization -&gt; … </a:t>
-            </a:r>
-            <a:r>
-              <a:rPr lang="en-US" sz="5600" dirty="0" smtClean="0"/>
-              <a:t>Roles</a:t>
-            </a:r>
-            <a:endParaRPr lang="en-US" sz="5600" dirty="0"/>
-          </a:p>
-          <a:p>
-            <a:r>
-              <a:rPr lang="en-US" sz="5600" dirty="0"/>
-              <a:t>Task States -&gt; Issue Statuses</a:t>
-            </a:r>
-          </a:p>
-          <a:p>
-            <a:r>
-              <a:rPr lang="en-US" sz="5600" dirty="0" err="1"/>
-              <a:t>Task.Types</a:t>
-            </a:r>
-            <a:r>
-              <a:rPr lang="en-US" sz="5600" dirty="0"/>
-              <a:t> -&gt; Issue </a:t>
-            </a:r>
-            <a:r>
-              <a:rPr lang="en-US" sz="5600" dirty="0" smtClean="0"/>
-              <a:t>Categories</a:t>
-            </a:r>
-            <a:endParaRPr lang="en-US" sz="5600" dirty="0"/>
+            <a:pPr marL="0" indent="0" algn="just">
+              <a:buNone/>
+            </a:pPr>
+            <a:r>
+              <a:rPr lang="en-US" dirty="0" smtClean="0"/>
+              <a:t>- </a:t>
+            </a:r>
+            <a:r>
+              <a:rPr lang="en-US" dirty="0" err="1" smtClean="0"/>
+              <a:t>Redmine</a:t>
+            </a:r>
+            <a:r>
+              <a:rPr lang="en-US" dirty="0" smtClean="0"/>
+              <a:t> </a:t>
+            </a:r>
+            <a:r>
+              <a:rPr lang="en-US" dirty="0" err="1" smtClean="0"/>
+              <a:t>usa</a:t>
+            </a:r>
+            <a:r>
+              <a:rPr lang="en-US" dirty="0" smtClean="0"/>
+              <a:t> REST API</a:t>
+            </a:r>
+          </a:p>
+          <a:p>
+            <a:pPr marL="0" indent="0" algn="just">
+              <a:buNone/>
+            </a:pPr>
+            <a:r>
+              <a:rPr lang="en-US" dirty="0" smtClean="0"/>
+              <a:t>Plugins </a:t>
+            </a:r>
+            <a:r>
+              <a:rPr lang="en-US" dirty="0" err="1" smtClean="0"/>
+              <a:t>existentes</a:t>
+            </a:r>
+            <a:r>
+              <a:rPr lang="en-US" dirty="0" smtClean="0"/>
+              <a:t> </a:t>
+            </a:r>
+            <a:r>
+              <a:rPr lang="en-US" dirty="0" err="1" smtClean="0"/>
+              <a:t>para</a:t>
+            </a:r>
+            <a:r>
+              <a:rPr lang="en-US" dirty="0" smtClean="0"/>
+              <a:t> </a:t>
+            </a:r>
+            <a:r>
+              <a:rPr lang="en-US" dirty="0" err="1" smtClean="0"/>
+              <a:t>integraç</a:t>
+            </a:r>
+            <a:r>
+              <a:rPr lang="en-US" dirty="0" err="1" smtClean="0"/>
+              <a:t>ão</a:t>
+            </a:r>
+            <a:r>
+              <a:rPr lang="en-US" dirty="0" smtClean="0"/>
+              <a:t>:</a:t>
+            </a:r>
+            <a:endParaRPr lang="en-US" dirty="0" smtClean="0"/>
+          </a:p>
+          <a:p>
+            <a:pPr marL="0" indent="0" algn="just">
+              <a:buNone/>
+            </a:pPr>
+            <a:r>
+              <a:rPr lang="en-US" dirty="0" smtClean="0"/>
+              <a:t>- </a:t>
+            </a:r>
+            <a:r>
+              <a:rPr lang="en-US" dirty="0" err="1" smtClean="0"/>
+              <a:t>Git</a:t>
+            </a:r>
+            <a:endParaRPr lang="en-US" dirty="0" smtClean="0"/>
+          </a:p>
+          <a:p>
+            <a:pPr marL="0" indent="0" algn="just">
+              <a:buNone/>
+            </a:pPr>
+            <a:r>
+              <a:rPr lang="en-US" dirty="0" smtClean="0"/>
+              <a:t>- Jenkins</a:t>
+            </a:r>
+          </a:p>
+          <a:p>
+            <a:pPr marL="0" indent="0" algn="just">
+              <a:buNone/>
+            </a:pPr>
+            <a:r>
+              <a:rPr lang="en-US" dirty="0" smtClean="0"/>
+              <a:t>(Para spark, </a:t>
+            </a:r>
+            <a:r>
+              <a:rPr lang="en-US" dirty="0" err="1" smtClean="0"/>
+              <a:t>usar</a:t>
+            </a:r>
+            <a:r>
+              <a:rPr lang="en-US" dirty="0" smtClean="0"/>
+              <a:t> o </a:t>
+            </a:r>
+            <a:r>
+              <a:rPr lang="en-US" dirty="0" err="1" smtClean="0"/>
+              <a:t>SparkPlug</a:t>
+            </a:r>
+            <a:r>
+              <a:rPr lang="en-US" smtClean="0"/>
+              <a:t>)</a:t>
+            </a:r>
+            <a:endParaRPr lang="en-US" dirty="0" smtClean="0"/>
+          </a:p>
+          <a:p>
+            <a:pPr marL="0" indent="0" algn="just">
+              <a:buNone/>
+            </a:pPr>
+            <a:r>
+              <a:rPr lang="en-US" dirty="0" smtClean="0"/>
+              <a:t>- </a:t>
+            </a:r>
+            <a:r>
+              <a:rPr lang="en-US" dirty="0" err="1" smtClean="0"/>
+              <a:t>Possibilidade</a:t>
+            </a:r>
+            <a:r>
+              <a:rPr lang="en-US" dirty="0" smtClean="0"/>
+              <a:t> de </a:t>
+            </a:r>
+            <a:r>
+              <a:rPr lang="en-US" dirty="0" err="1" smtClean="0"/>
+              <a:t>migrar</a:t>
+            </a:r>
+            <a:r>
+              <a:rPr lang="en-US" dirty="0" smtClean="0"/>
+              <a:t> dados </a:t>
+            </a:r>
+            <a:r>
+              <a:rPr lang="en-US" dirty="0" err="1" smtClean="0"/>
+              <a:t>usando</a:t>
+            </a:r>
+            <a:r>
+              <a:rPr lang="en-US" dirty="0" smtClean="0"/>
+              <a:t> Postman / Newman</a:t>
+            </a:r>
+            <a:endParaRPr lang="en-US" dirty="0"/>
           </a:p>
         </p:txBody>
       </p:sp>
@@ -9717,103 +9856,17 @@
           <a:p>
             <a:r>
               <a:rPr lang="en-US" sz="2700" b="1" dirty="0" err="1" smtClean="0"/>
-              <a:t>Runrun</a:t>
+              <a:t>Integraç</a:t>
+            </a:r>
+            <a:r>
+              <a:rPr lang="en-US" sz="2700" b="1" dirty="0" err="1" smtClean="0"/>
+              <a:t>ões</a:t>
             </a:r>
             <a:r>
               <a:rPr lang="en-US" sz="2700" b="1" dirty="0" smtClean="0"/>
-              <a:t> =&gt; </a:t>
-            </a:r>
-            <a:r>
-              <a:rPr lang="en-US" sz="2700" b="1" dirty="0" err="1" smtClean="0"/>
-              <a:t>Redmine</a:t>
+              <a:t>:</a:t>
             </a:r>
             <a:endParaRPr lang="en-US" sz="2700" b="1" dirty="0"/>
-          </a:p>
-        </p:txBody>
-      </p:sp>
-      <p:sp>
-        <p:nvSpPr>
-          <p:cNvPr id="6" name="TextBox 5"/>
-          <p:cNvSpPr txBox="1"/>
-          <p:nvPr/>
-        </p:nvSpPr>
-        <p:spPr>
-          <a:xfrm>
-            <a:off x="4912153" y="2197669"/>
-            <a:ext cx="4130673" cy="4247316"/>
-          </a:xfrm>
-          <a:prstGeom prst="rect">
-            <a:avLst/>
-          </a:prstGeom>
-          <a:noFill/>
-        </p:spPr>
-        <p:txBody>
-          <a:bodyPr wrap="square" rtlCol="0">
-            <a:spAutoFit/>
-          </a:bodyPr>
-          <a:lstStyle/>
-          <a:p>
-            <a:pPr marL="457200" indent="-457200">
-              <a:buFont typeface="Arial"/>
-              <a:buChar char="•"/>
-            </a:pPr>
-            <a:r>
-              <a:rPr lang="en-US" sz="2700" dirty="0"/>
-              <a:t>Tags -&gt; Custom Fields</a:t>
-            </a:r>
-          </a:p>
-          <a:p>
-            <a:pPr marL="457200" indent="-457200">
-              <a:buFont typeface="Arial"/>
-              <a:buChar char="•"/>
-            </a:pPr>
-            <a:r>
-              <a:rPr lang="en-US" sz="2700" dirty="0"/>
-              <a:t>Project -&gt; Projects</a:t>
-            </a:r>
-          </a:p>
-          <a:p>
-            <a:pPr marL="457200" indent="-457200">
-              <a:buFont typeface="Arial"/>
-              <a:buChar char="•"/>
-            </a:pPr>
-            <a:r>
-              <a:rPr lang="en-US" sz="2700" dirty="0"/>
-              <a:t>Tasks -&gt; Issues</a:t>
-            </a:r>
-          </a:p>
-          <a:p>
-            <a:pPr marL="457200" indent="-457200">
-              <a:buFont typeface="Arial"/>
-              <a:buChar char="•"/>
-            </a:pPr>
-            <a:r>
-              <a:rPr lang="en-US" sz="2700" dirty="0"/>
-              <a:t>Comments -&gt; Issue Journals</a:t>
-            </a:r>
-          </a:p>
-          <a:p>
-            <a:pPr marL="457200" indent="-457200">
-              <a:buFont typeface="Arial"/>
-              <a:buChar char="•"/>
-            </a:pPr>
-            <a:r>
-              <a:rPr lang="en-US" sz="2700" dirty="0"/>
-              <a:t>Attachments -&gt; Documents</a:t>
-            </a:r>
-          </a:p>
-          <a:p>
-            <a:pPr marL="457200" indent="-457200">
-              <a:buFont typeface="Arial"/>
-              <a:buChar char="•"/>
-            </a:pPr>
-            <a:r>
-              <a:rPr lang="en-US" sz="2700" dirty="0"/>
-              <a:t>Checklist Items, Checklist -&gt; Custom Field</a:t>
-            </a:r>
-          </a:p>
-          <a:p>
-            <a:endParaRPr lang="en-US" sz="2700" dirty="0"/>
           </a:p>
         </p:txBody>
       </p:sp>
@@ -9884,14 +9937,91 @@
       </p:sp>
       <p:sp>
         <p:nvSpPr>
-          <p:cNvPr id="7" name="TextBox 6"/>
+          <p:cNvPr id="3" name="Content Placeholder 2"/>
+          <p:cNvSpPr>
+            <a:spLocks noGrp="1"/>
+          </p:cNvSpPr>
+          <p:nvPr>
+            <p:ph idx="1"/>
+          </p:nvPr>
+        </p:nvSpPr>
+        <p:spPr>
+          <a:xfrm>
+            <a:off x="284164" y="1828336"/>
+            <a:ext cx="4348890" cy="4297828"/>
+          </a:xfrm>
+        </p:spPr>
+        <p:txBody>
+          <a:bodyPr>
+            <a:normAutofit fontScale="47500" lnSpcReduction="20000"/>
+          </a:bodyPr>
+          <a:lstStyle/>
+          <a:p>
+            <a:pPr marL="0" indent="0" algn="just">
+              <a:buNone/>
+            </a:pPr>
+            <a:endParaRPr lang="en-US" dirty="0" smtClean="0"/>
+          </a:p>
+          <a:p>
+            <a:r>
+              <a:rPr lang="en-US" sz="5600" dirty="0" smtClean="0"/>
+              <a:t>Users </a:t>
+            </a:r>
+            <a:r>
+              <a:rPr lang="en-US" sz="5600" dirty="0"/>
+              <a:t>-&gt; Users</a:t>
+            </a:r>
+          </a:p>
+          <a:p>
+            <a:r>
+              <a:rPr lang="en-US" sz="5600" dirty="0"/>
+              <a:t>Teams -&gt; Groups</a:t>
+            </a:r>
+          </a:p>
+          <a:p>
+            <a:r>
+              <a:rPr lang="en-US" sz="5600" dirty="0"/>
+              <a:t>Team Authorization -&gt; … </a:t>
+            </a:r>
+            <a:r>
+              <a:rPr lang="en-US" sz="5600" dirty="0" smtClean="0"/>
+              <a:t>Roles</a:t>
+            </a:r>
+            <a:endParaRPr lang="en-US" sz="5600" dirty="0"/>
+          </a:p>
+          <a:p>
+            <a:r>
+              <a:rPr lang="en-US" sz="5600" dirty="0"/>
+              <a:t>Task States -&gt; Issue Statuses</a:t>
+            </a:r>
+          </a:p>
+          <a:p>
+            <a:r>
+              <a:rPr lang="en-US" sz="5600" dirty="0" err="1"/>
+              <a:t>Task.Types</a:t>
+            </a:r>
+            <a:r>
+              <a:rPr lang="en-US" sz="5600" dirty="0"/>
+              <a:t> -&gt; Issue </a:t>
+            </a:r>
+            <a:r>
+              <a:rPr lang="en-US" sz="5600" dirty="0" smtClean="0"/>
+              <a:t>Categories</a:t>
+            </a:r>
+            <a:endParaRPr lang="en-US" sz="5600" dirty="0"/>
+          </a:p>
+        </p:txBody>
+      </p:sp>
+      <p:sp>
+        <p:nvSpPr>
+          <p:cNvPr id="4" name="TextBox 3"/>
           <p:cNvSpPr txBox="1"/>
           <p:nvPr/>
         </p:nvSpPr>
         <p:spPr>
           <a:xfrm>
-            <a:off x="284163" y="1947489"/>
-            <a:ext cx="1029154" cy="507831"/>
+            <a:off x="284163" y="1828336"/>
+            <a:ext cx="3040373" cy="507831"/>
           </a:xfrm>
           <a:prstGeom prst="rect">
             <a:avLst/>
@@ -9899,15 +10029,109 @@
           <a:noFill/>
         </p:spPr>
         <p:txBody>
-          <a:bodyPr wrap="none" rtlCol="0">
+          <a:bodyPr wrap="square" rtlCol="0">
             <a:spAutoFit/>
           </a:bodyPr>
           <a:lstStyle/>
           <a:p>
             <a:r>
-              <a:rPr lang="en-US" sz="2700" dirty="0" smtClean="0"/>
-              <a:t>Demo</a:t>
-            </a:r>
+              <a:rPr lang="en-US" sz="2700" b="1" dirty="0" err="1" smtClean="0"/>
+              <a:t>Runrun</a:t>
+            </a:r>
+            <a:r>
+              <a:rPr lang="en-US" sz="2700" b="1" dirty="0" smtClean="0"/>
+              <a:t> =&gt; </a:t>
+            </a:r>
+            <a:r>
+              <a:rPr lang="en-US" sz="2700" b="1" dirty="0" err="1" smtClean="0"/>
+              <a:t>Redmine</a:t>
+            </a:r>
+            <a:endParaRPr lang="en-US" sz="2700" b="1" dirty="0"/>
+          </a:p>
+        </p:txBody>
+      </p:sp>
+      <p:sp>
+        <p:nvSpPr>
+          <p:cNvPr id="6" name="TextBox 5"/>
+          <p:cNvSpPr txBox="1"/>
+          <p:nvPr/>
+        </p:nvSpPr>
+        <p:spPr>
+          <a:xfrm>
+            <a:off x="4912153" y="2197669"/>
+            <a:ext cx="4130673" cy="4247316"/>
+          </a:xfrm>
+          <a:prstGeom prst="rect">
+            <a:avLst/>
+          </a:prstGeom>
+          <a:noFill/>
+        </p:spPr>
+        <p:txBody>
+          <a:bodyPr wrap="square" rtlCol="0">
+            <a:spAutoFit/>
+          </a:bodyPr>
+          <a:lstStyle/>
+          <a:p>
+            <a:pPr marL="457200" indent="-457200">
+              <a:buFont typeface="Arial"/>
+              <a:buChar char="•"/>
+            </a:pPr>
+            <a:r>
+              <a:rPr lang="en-US" sz="2700" dirty="0"/>
+              <a:t>Tags -&gt; Custom Fields</a:t>
+            </a:r>
+          </a:p>
+          <a:p>
+            <a:pPr marL="457200" indent="-457200">
+              <a:buFont typeface="Arial"/>
+              <a:buChar char="•"/>
+            </a:pPr>
+            <a:r>
+              <a:rPr lang="en-US" sz="2700" dirty="0"/>
+              <a:t>Project -&gt; Projects</a:t>
+            </a:r>
+          </a:p>
+          <a:p>
+            <a:pPr marL="457200" indent="-457200">
+              <a:buFont typeface="Arial"/>
+              <a:buChar char="•"/>
+            </a:pPr>
+            <a:r>
+              <a:rPr lang="en-US" sz="2700" dirty="0"/>
+              <a:t>Tasks -&gt; Issues</a:t>
+            </a:r>
+          </a:p>
+          <a:p>
+            <a:pPr marL="457200" indent="-457200">
+              <a:buFont typeface="Arial"/>
+              <a:buChar char="•"/>
+            </a:pPr>
+            <a:r>
+              <a:rPr lang="en-US" sz="2700" dirty="0"/>
+              <a:t>Comments -&gt; Issue Journals</a:t>
+            </a:r>
+          </a:p>
+          <a:p>
+            <a:pPr marL="457200" indent="-457200">
+              <a:buFont typeface="Arial"/>
+              <a:buChar char="•"/>
+            </a:pPr>
+            <a:r>
+              <a:rPr lang="en-US" sz="2700" dirty="0"/>
+              <a:t>Attachments -&gt; Documents</a:t>
+            </a:r>
+          </a:p>
+          <a:p>
+            <a:pPr marL="457200" indent="-457200">
+              <a:buFont typeface="Arial"/>
+              <a:buChar char="•"/>
+            </a:pPr>
+            <a:r>
+              <a:rPr lang="en-US" sz="2700" dirty="0"/>
+              <a:t>Checklist Items, Checklist -&gt; Custom Field</a:t>
+            </a:r>
+          </a:p>
+          <a:p>
             <a:endParaRPr lang="en-US" sz="2700" dirty="0"/>
           </a:p>
         </p:txBody>
@@ -9915,7 +10139,7 @@
     </p:spTree>
     <p:extLst>
       <p:ext uri="{BB962C8B-B14F-4D97-AF65-F5344CB8AC3E}">
-        <p14:creationId xmlns:p14="http://schemas.microsoft.com/office/powerpoint/2010/main" val="1231488954"/>
+        <p14:creationId xmlns:p14="http://schemas.microsoft.com/office/powerpoint/2010/main" val="48982866"/>
       </p:ext>
     </p:extLst>
   </p:cSld>
@@ -10176,6 +10400,101 @@
 </file>
 
 <file path=ppt/slides/slide20.xml><?xml version="1.0" encoding="utf-8"?>
+<p:sld xmlns:a="http://schemas.openxmlformats.org/drawingml/2006/main" xmlns:r="http://schemas.openxmlformats.org/officeDocument/2006/relationships" xmlns:p="http://schemas.openxmlformats.org/presentationml/2006/main">
+  <p:cSld>
+    <p:spTree>
+      <p:nvGrpSpPr>
+        <p:cNvPr id="1" name=""/>
+        <p:cNvGrpSpPr/>
+        <p:nvPr/>
+      </p:nvGrpSpPr>
+      <p:grpSpPr>
+        <a:xfrm>
+          <a:off x="0" y="0"/>
+          <a:ext cx="0" cy="0"/>
+          <a:chOff x="0" y="0"/>
+          <a:chExt cx="0" cy="0"/>
+        </a:xfrm>
+      </p:grpSpPr>
+      <p:sp>
+        <p:nvSpPr>
+          <p:cNvPr id="2" name="Title 1"/>
+          <p:cNvSpPr>
+            <a:spLocks noGrp="1"/>
+          </p:cNvSpPr>
+          <p:nvPr>
+            <p:ph type="title"/>
+          </p:nvPr>
+        </p:nvSpPr>
+        <p:spPr/>
+        <p:txBody>
+          <a:bodyPr/>
+          <a:lstStyle/>
+          <a:p>
+            <a:pPr algn="l"/>
+            <a:r>
+              <a:rPr lang="pt-BR" dirty="0" err="1"/>
+              <a:t>How</a:t>
+            </a:r>
+            <a:r>
+              <a:rPr lang="pt-BR" dirty="0"/>
+              <a:t> (como usar?)</a:t>
+            </a:r>
+            <a:endParaRPr lang="en-US" dirty="0"/>
+          </a:p>
+        </p:txBody>
+      </p:sp>
+      <p:sp>
+        <p:nvSpPr>
+          <p:cNvPr id="7" name="TextBox 6"/>
+          <p:cNvSpPr txBox="1"/>
+          <p:nvPr/>
+        </p:nvSpPr>
+        <p:spPr>
+          <a:xfrm>
+            <a:off x="284163" y="1947489"/>
+            <a:ext cx="1029154" cy="507831"/>
+          </a:xfrm>
+          <a:prstGeom prst="rect">
+            <a:avLst/>
+          </a:prstGeom>
+          <a:noFill/>
+        </p:spPr>
+        <p:txBody>
+          <a:bodyPr wrap="none" rtlCol="0">
+            <a:spAutoFit/>
+          </a:bodyPr>
+          <a:lstStyle/>
+          <a:p>
+            <a:r>
+              <a:rPr lang="en-US" sz="2700" dirty="0" smtClean="0"/>
+              <a:t>Demo</a:t>
+            </a:r>
+            <a:endParaRPr lang="en-US" sz="2700" dirty="0"/>
+          </a:p>
+        </p:txBody>
+      </p:sp>
+    </p:spTree>
+    <p:extLst>
+      <p:ext uri="{BB962C8B-B14F-4D97-AF65-F5344CB8AC3E}">
+        <p14:creationId xmlns:p14="http://schemas.microsoft.com/office/powerpoint/2010/main" val="1231488954"/>
+      </p:ext>
+    </p:extLst>
+  </p:cSld>
+  <p:clrMapOvr>
+    <a:masterClrMapping/>
+  </p:clrMapOvr>
+  <p:timing>
+    <p:tnLst>
+      <p:par>
+        <p:cTn xmlns:p14="http://schemas.microsoft.com/office/powerpoint/2010/main" id="1" dur="indefinite" restart="never" nodeType="tmRoot"/>
+      </p:par>
+    </p:tnLst>
+  </p:timing>
+</p:sld>
+</file>
+
+<file path=ppt/slides/slide21.xml><?xml version="1.0" encoding="utf-8"?>
 <p:sld xmlns:a="http://schemas.openxmlformats.org/drawingml/2006/main" xmlns:r="http://schemas.openxmlformats.org/officeDocument/2006/relationships" xmlns:p="http://schemas.openxmlformats.org/presentationml/2006/main">
   <p:cSld>
     <p:bg>
@@ -11303,7 +11622,6 @@
               <a:rPr lang="en-US" dirty="0"/>
               <a:t>.</a:t>
             </a:r>
-            <a:endParaRPr lang="en-US" dirty="0"/>
           </a:p>
         </p:txBody>
       </p:sp>
@@ -11489,7 +11807,6 @@
               <a:rPr lang="en-US" dirty="0"/>
               <a:t>).</a:t>
             </a:r>
-            <a:endParaRPr lang="en-US" dirty="0"/>
           </a:p>
         </p:txBody>
       </p:sp>
@@ -11642,11 +11959,7 @@
             </a:r>
             <a:r>
               <a:rPr lang="en-US" dirty="0" err="1" smtClean="0"/>
-              <a:t>configuraç</a:t>
-            </a:r>
-            <a:r>
-              <a:rPr lang="en-US" dirty="0" err="1" smtClean="0"/>
-              <a:t>ão</a:t>
+              <a:t>configuração</a:t>
             </a:r>
             <a:r>
               <a:rPr lang="en-US" dirty="0" smtClean="0"/>

</xml_diff>